<commit_message>
Ajout de la défense du projet
</commit_message>
<xml_diff>
--- a/docs/Reports/PS5 - Presentation cahier V1 - Geinoz.pptx
+++ b/docs/Reports/PS5 - Presentation cahier V1 - Geinoz.pptx
@@ -264,7 +264,7 @@
           <a:p>
             <a:fld id="{53D57147-4566-4832-87AF-043E85D8FC2A}" type="datetimeFigureOut">
               <a:rPr lang="en-GB" smtClean="0"/>
-              <a:t>20/10/2021</a:t>
+              <a:t>08/02/2022</a:t>
             </a:fld>
             <a:endParaRPr lang="en-GB"/>
           </a:p>
@@ -464,7 +464,7 @@
           <a:p>
             <a:fld id="{53D57147-4566-4832-87AF-043E85D8FC2A}" type="datetimeFigureOut">
               <a:rPr lang="en-GB" smtClean="0"/>
-              <a:t>20/10/2021</a:t>
+              <a:t>08/02/2022</a:t>
             </a:fld>
             <a:endParaRPr lang="en-GB"/>
           </a:p>
@@ -674,7 +674,7 @@
           <a:p>
             <a:fld id="{53D57147-4566-4832-87AF-043E85D8FC2A}" type="datetimeFigureOut">
               <a:rPr lang="en-GB" smtClean="0"/>
-              <a:t>20/10/2021</a:t>
+              <a:t>08/02/2022</a:t>
             </a:fld>
             <a:endParaRPr lang="en-GB"/>
           </a:p>
@@ -874,7 +874,7 @@
           <a:p>
             <a:fld id="{53D57147-4566-4832-87AF-043E85D8FC2A}" type="datetimeFigureOut">
               <a:rPr lang="en-GB" smtClean="0"/>
-              <a:t>20/10/2021</a:t>
+              <a:t>08/02/2022</a:t>
             </a:fld>
             <a:endParaRPr lang="en-GB"/>
           </a:p>
@@ -1150,7 +1150,7 @@
           <a:p>
             <a:fld id="{53D57147-4566-4832-87AF-043E85D8FC2A}" type="datetimeFigureOut">
               <a:rPr lang="en-GB" smtClean="0"/>
-              <a:t>20/10/2021</a:t>
+              <a:t>08/02/2022</a:t>
             </a:fld>
             <a:endParaRPr lang="en-GB"/>
           </a:p>
@@ -1418,7 +1418,7 @@
           <a:p>
             <a:fld id="{53D57147-4566-4832-87AF-043E85D8FC2A}" type="datetimeFigureOut">
               <a:rPr lang="en-GB" smtClean="0"/>
-              <a:t>20/10/2021</a:t>
+              <a:t>08/02/2022</a:t>
             </a:fld>
             <a:endParaRPr lang="en-GB"/>
           </a:p>
@@ -1833,7 +1833,7 @@
           <a:p>
             <a:fld id="{53D57147-4566-4832-87AF-043E85D8FC2A}" type="datetimeFigureOut">
               <a:rPr lang="en-GB" smtClean="0"/>
-              <a:t>20/10/2021</a:t>
+              <a:t>08/02/2022</a:t>
             </a:fld>
             <a:endParaRPr lang="en-GB"/>
           </a:p>
@@ -1975,7 +1975,7 @@
           <a:p>
             <a:fld id="{53D57147-4566-4832-87AF-043E85D8FC2A}" type="datetimeFigureOut">
               <a:rPr lang="en-GB" smtClean="0"/>
-              <a:t>20/10/2021</a:t>
+              <a:t>08/02/2022</a:t>
             </a:fld>
             <a:endParaRPr lang="en-GB"/>
           </a:p>
@@ -2088,7 +2088,7 @@
           <a:p>
             <a:fld id="{53D57147-4566-4832-87AF-043E85D8FC2A}" type="datetimeFigureOut">
               <a:rPr lang="en-GB" smtClean="0"/>
-              <a:t>20/10/2021</a:t>
+              <a:t>08/02/2022</a:t>
             </a:fld>
             <a:endParaRPr lang="en-GB"/>
           </a:p>
@@ -2401,7 +2401,7 @@
           <a:p>
             <a:fld id="{53D57147-4566-4832-87AF-043E85D8FC2A}" type="datetimeFigureOut">
               <a:rPr lang="en-GB" smtClean="0"/>
-              <a:t>20/10/2021</a:t>
+              <a:t>08/02/2022</a:t>
             </a:fld>
             <a:endParaRPr lang="en-GB"/>
           </a:p>
@@ -2690,7 +2690,7 @@
           <a:p>
             <a:fld id="{53D57147-4566-4832-87AF-043E85D8FC2A}" type="datetimeFigureOut">
               <a:rPr lang="en-GB" smtClean="0"/>
-              <a:t>20/10/2021</a:t>
+              <a:t>08/02/2022</a:t>
             </a:fld>
             <a:endParaRPr lang="en-GB"/>
           </a:p>
@@ -2933,7 +2933,7 @@
           <a:p>
             <a:fld id="{53D57147-4566-4832-87AF-043E85D8FC2A}" type="datetimeFigureOut">
               <a:rPr lang="en-GB" smtClean="0"/>
-              <a:t>20/10/2021</a:t>
+              <a:t>08/02/2022</a:t>
             </a:fld>
             <a:endParaRPr lang="en-GB"/>
           </a:p>

</xml_diff>